<commit_message>
fixes to 16/9 slides
</commit_message>
<xml_diff>
--- a/mdl4ui-docs/mdl4ui_cg2013_16_9.pptx
+++ b/mdl4ui-docs/mdl4ui_cg2013_16_9.pptx
@@ -335,7 +335,7 @@
     </p:spTree>
     <p:extLst>
       <p:ext uri="{BB962C8B-B14F-4D97-AF65-F5344CB8AC3E}">
-        <p14:creationId xmlns:p14="http://schemas.microsoft.com/office/powerpoint/2010/main" xmlns="" val="70803672"/>
+        <p14:creationId xmlns="" xmlns:p14="http://schemas.microsoft.com/office/powerpoint/2010/main" val="70803672"/>
       </p:ext>
     </p:extLst>
   </p:cSld>
@@ -595,7 +595,7 @@
     </p:spTree>
     <p:extLst>
       <p:ext uri="{BB962C8B-B14F-4D97-AF65-F5344CB8AC3E}">
-        <p14:creationId xmlns:p14="http://schemas.microsoft.com/office/powerpoint/2010/main" xmlns="" val="1701488114"/>
+        <p14:creationId xmlns="" xmlns:p14="http://schemas.microsoft.com/office/powerpoint/2010/main" val="1701488114"/>
       </p:ext>
     </p:extLst>
   </p:cSld>
@@ -775,7 +775,7 @@
     </p:spTree>
     <p:extLst>
       <p:ext uri="{BB962C8B-B14F-4D97-AF65-F5344CB8AC3E}">
-        <p14:creationId xmlns:p14="http://schemas.microsoft.com/office/powerpoint/2010/main" xmlns="" val="1930402387"/>
+        <p14:creationId xmlns="" xmlns:p14="http://schemas.microsoft.com/office/powerpoint/2010/main" val="1930402387"/>
       </p:ext>
     </p:extLst>
   </p:cSld>
@@ -865,7 +865,7 @@
     </p:spTree>
     <p:extLst>
       <p:ext uri="{BB962C8B-B14F-4D97-AF65-F5344CB8AC3E}">
-        <p14:creationId xmlns:p14="http://schemas.microsoft.com/office/powerpoint/2010/main" xmlns="" val="3047004223"/>
+        <p14:creationId xmlns="" xmlns:p14="http://schemas.microsoft.com/office/powerpoint/2010/main" val="3047004223"/>
       </p:ext>
     </p:extLst>
   </p:cSld>
@@ -955,7 +955,7 @@
     </p:spTree>
     <p:extLst>
       <p:ext uri="{BB962C8B-B14F-4D97-AF65-F5344CB8AC3E}">
-        <p14:creationId xmlns:p14="http://schemas.microsoft.com/office/powerpoint/2010/main" xmlns="" val="3280979232"/>
+        <p14:creationId xmlns="" xmlns:p14="http://schemas.microsoft.com/office/powerpoint/2010/main" val="3280979232"/>
       </p:ext>
     </p:extLst>
   </p:cSld>
@@ -1049,7 +1049,7 @@
     </p:spTree>
     <p:extLst>
       <p:ext uri="{BB962C8B-B14F-4D97-AF65-F5344CB8AC3E}">
-        <p14:creationId xmlns:p14="http://schemas.microsoft.com/office/powerpoint/2010/main" xmlns="" val="4003299204"/>
+        <p14:creationId xmlns="" xmlns:p14="http://schemas.microsoft.com/office/powerpoint/2010/main" val="4003299204"/>
       </p:ext>
     </p:extLst>
   </p:cSld>
@@ -1139,7 +1139,7 @@
     </p:spTree>
     <p:extLst>
       <p:ext uri="{BB962C8B-B14F-4D97-AF65-F5344CB8AC3E}">
-        <p14:creationId xmlns:p14="http://schemas.microsoft.com/office/powerpoint/2010/main" xmlns="" val="1987381696"/>
+        <p14:creationId xmlns="" xmlns:p14="http://schemas.microsoft.com/office/powerpoint/2010/main" val="1987381696"/>
       </p:ext>
     </p:extLst>
   </p:cSld>
@@ -1320,7 +1320,7 @@
     </p:spTree>
     <p:extLst>
       <p:ext uri="{BB962C8B-B14F-4D97-AF65-F5344CB8AC3E}">
-        <p14:creationId xmlns:p14="http://schemas.microsoft.com/office/powerpoint/2010/main" xmlns="" val="2622818044"/>
+        <p14:creationId xmlns="" xmlns:p14="http://schemas.microsoft.com/office/powerpoint/2010/main" val="2622818044"/>
       </p:ext>
     </p:extLst>
   </p:cSld>
@@ -1414,7 +1414,7 @@
     </p:spTree>
     <p:extLst>
       <p:ext uri="{BB962C8B-B14F-4D97-AF65-F5344CB8AC3E}">
-        <p14:creationId xmlns:p14="http://schemas.microsoft.com/office/powerpoint/2010/main" xmlns="" val="3848866699"/>
+        <p14:creationId xmlns="" xmlns:p14="http://schemas.microsoft.com/office/powerpoint/2010/main" val="3848866699"/>
       </p:ext>
     </p:extLst>
   </p:cSld>
@@ -1504,7 +1504,7 @@
     </p:spTree>
     <p:extLst>
       <p:ext uri="{BB962C8B-B14F-4D97-AF65-F5344CB8AC3E}">
-        <p14:creationId xmlns:p14="http://schemas.microsoft.com/office/powerpoint/2010/main" xmlns="" val="1723799457"/>
+        <p14:creationId xmlns="" xmlns:p14="http://schemas.microsoft.com/office/powerpoint/2010/main" val="1723799457"/>
       </p:ext>
     </p:extLst>
   </p:cSld>
@@ -1598,7 +1598,7 @@
     </p:spTree>
     <p:extLst>
       <p:ext uri="{BB962C8B-B14F-4D97-AF65-F5344CB8AC3E}">
-        <p14:creationId xmlns:p14="http://schemas.microsoft.com/office/powerpoint/2010/main" xmlns="" val="2615589008"/>
+        <p14:creationId xmlns="" xmlns:p14="http://schemas.microsoft.com/office/powerpoint/2010/main" val="2615589008"/>
       </p:ext>
     </p:extLst>
   </p:cSld>
@@ -1692,7 +1692,7 @@
     </p:spTree>
     <p:extLst>
       <p:ext uri="{BB962C8B-B14F-4D97-AF65-F5344CB8AC3E}">
-        <p14:creationId xmlns:p14="http://schemas.microsoft.com/office/powerpoint/2010/main" xmlns="" val="805948727"/>
+        <p14:creationId xmlns="" xmlns:p14="http://schemas.microsoft.com/office/powerpoint/2010/main" val="805948727"/>
       </p:ext>
     </p:extLst>
   </p:cSld>
@@ -1782,7 +1782,7 @@
     </p:spTree>
     <p:extLst>
       <p:ext uri="{BB962C8B-B14F-4D97-AF65-F5344CB8AC3E}">
-        <p14:creationId xmlns:p14="http://schemas.microsoft.com/office/powerpoint/2010/main" xmlns="" val="2091590988"/>
+        <p14:creationId xmlns="" xmlns:p14="http://schemas.microsoft.com/office/powerpoint/2010/main" val="2091590988"/>
       </p:ext>
     </p:extLst>
   </p:cSld>
@@ -1963,7 +1963,7 @@
     </p:spTree>
     <p:extLst>
       <p:ext uri="{BB962C8B-B14F-4D97-AF65-F5344CB8AC3E}">
-        <p14:creationId xmlns:p14="http://schemas.microsoft.com/office/powerpoint/2010/main" xmlns="" val="3883449842"/>
+        <p14:creationId xmlns="" xmlns:p14="http://schemas.microsoft.com/office/powerpoint/2010/main" val="3883449842"/>
       </p:ext>
     </p:extLst>
   </p:cSld>
@@ -2057,7 +2057,7 @@
     </p:spTree>
     <p:extLst>
       <p:ext uri="{BB962C8B-B14F-4D97-AF65-F5344CB8AC3E}">
-        <p14:creationId xmlns:p14="http://schemas.microsoft.com/office/powerpoint/2010/main" xmlns="" val="1197186210"/>
+        <p14:creationId xmlns="" xmlns:p14="http://schemas.microsoft.com/office/powerpoint/2010/main" val="1197186210"/>
       </p:ext>
     </p:extLst>
   </p:cSld>
@@ -2155,7 +2155,7 @@
     </p:spTree>
     <p:extLst>
       <p:ext uri="{BB962C8B-B14F-4D97-AF65-F5344CB8AC3E}">
-        <p14:creationId xmlns:p14="http://schemas.microsoft.com/office/powerpoint/2010/main" xmlns="" val="1927629519"/>
+        <p14:creationId xmlns="" xmlns:p14="http://schemas.microsoft.com/office/powerpoint/2010/main" val="1927629519"/>
       </p:ext>
     </p:extLst>
   </p:cSld>
@@ -2399,7 +2399,7 @@
     </p:spTree>
     <p:extLst>
       <p:ext uri="{BB962C8B-B14F-4D97-AF65-F5344CB8AC3E}">
-        <p14:creationId xmlns:p14="http://schemas.microsoft.com/office/powerpoint/2010/main" xmlns="" val="322609761"/>
+        <p14:creationId xmlns="" xmlns:p14="http://schemas.microsoft.com/office/powerpoint/2010/main" val="322609761"/>
       </p:ext>
     </p:extLst>
   </p:cSld>
@@ -2571,7 +2571,7 @@
     </p:spTree>
     <p:extLst>
       <p:ext uri="{BB962C8B-B14F-4D97-AF65-F5344CB8AC3E}">
-        <p14:creationId xmlns:p14="http://schemas.microsoft.com/office/powerpoint/2010/main" xmlns="" val="1248456722"/>
+        <p14:creationId xmlns="" xmlns:p14="http://schemas.microsoft.com/office/powerpoint/2010/main" val="1248456722"/>
       </p:ext>
     </p:extLst>
   </p:cSld>
@@ -2753,7 +2753,7 @@
     </p:spTree>
     <p:extLst>
       <p:ext uri="{BB962C8B-B14F-4D97-AF65-F5344CB8AC3E}">
-        <p14:creationId xmlns:p14="http://schemas.microsoft.com/office/powerpoint/2010/main" xmlns="" val="4236232986"/>
+        <p14:creationId xmlns="" xmlns:p14="http://schemas.microsoft.com/office/powerpoint/2010/main" val="4236232986"/>
       </p:ext>
     </p:extLst>
   </p:cSld>
@@ -2925,7 +2925,7 @@
     </p:spTree>
     <p:extLst>
       <p:ext uri="{BB962C8B-B14F-4D97-AF65-F5344CB8AC3E}">
-        <p14:creationId xmlns:p14="http://schemas.microsoft.com/office/powerpoint/2010/main" xmlns="" val="3454835055"/>
+        <p14:creationId xmlns="" xmlns:p14="http://schemas.microsoft.com/office/powerpoint/2010/main" val="3454835055"/>
       </p:ext>
     </p:extLst>
   </p:cSld>
@@ -3180,7 +3180,7 @@
     </p:spTree>
     <p:extLst>
       <p:ext uri="{BB962C8B-B14F-4D97-AF65-F5344CB8AC3E}">
-        <p14:creationId xmlns:p14="http://schemas.microsoft.com/office/powerpoint/2010/main" xmlns="" val="804127244"/>
+        <p14:creationId xmlns="" xmlns:p14="http://schemas.microsoft.com/office/powerpoint/2010/main" val="804127244"/>
       </p:ext>
     </p:extLst>
   </p:cSld>
@@ -3470,7 +3470,7 @@
     </p:spTree>
     <p:extLst>
       <p:ext uri="{BB962C8B-B14F-4D97-AF65-F5344CB8AC3E}">
-        <p14:creationId xmlns:p14="http://schemas.microsoft.com/office/powerpoint/2010/main" xmlns="" val="586698658"/>
+        <p14:creationId xmlns="" xmlns:p14="http://schemas.microsoft.com/office/powerpoint/2010/main" val="586698658"/>
       </p:ext>
     </p:extLst>
   </p:cSld>
@@ -3894,7 +3894,7 @@
     </p:spTree>
     <p:extLst>
       <p:ext uri="{BB962C8B-B14F-4D97-AF65-F5344CB8AC3E}">
-        <p14:creationId xmlns:p14="http://schemas.microsoft.com/office/powerpoint/2010/main" xmlns="" val="19144436"/>
+        <p14:creationId xmlns="" xmlns:p14="http://schemas.microsoft.com/office/powerpoint/2010/main" val="19144436"/>
       </p:ext>
     </p:extLst>
   </p:cSld>
@@ -4014,7 +4014,7 @@
     </p:spTree>
     <p:extLst>
       <p:ext uri="{BB962C8B-B14F-4D97-AF65-F5344CB8AC3E}">
-        <p14:creationId xmlns:p14="http://schemas.microsoft.com/office/powerpoint/2010/main" xmlns="" val="202749597"/>
+        <p14:creationId xmlns="" xmlns:p14="http://schemas.microsoft.com/office/powerpoint/2010/main" val="202749597"/>
       </p:ext>
     </p:extLst>
   </p:cSld>
@@ -4111,7 +4111,7 @@
     </p:spTree>
     <p:extLst>
       <p:ext uri="{BB962C8B-B14F-4D97-AF65-F5344CB8AC3E}">
-        <p14:creationId xmlns:p14="http://schemas.microsoft.com/office/powerpoint/2010/main" xmlns="" val="2898363528"/>
+        <p14:creationId xmlns="" xmlns:p14="http://schemas.microsoft.com/office/powerpoint/2010/main" val="2898363528"/>
       </p:ext>
     </p:extLst>
   </p:cSld>
@@ -4390,7 +4390,7 @@
     </p:spTree>
     <p:extLst>
       <p:ext uri="{BB962C8B-B14F-4D97-AF65-F5344CB8AC3E}">
-        <p14:creationId xmlns:p14="http://schemas.microsoft.com/office/powerpoint/2010/main" xmlns="" val="4010598191"/>
+        <p14:creationId xmlns="" xmlns:p14="http://schemas.microsoft.com/office/powerpoint/2010/main" val="4010598191"/>
       </p:ext>
     </p:extLst>
   </p:cSld>
@@ -4645,7 +4645,7 @@
     </p:spTree>
     <p:extLst>
       <p:ext uri="{BB962C8B-B14F-4D97-AF65-F5344CB8AC3E}">
-        <p14:creationId xmlns:p14="http://schemas.microsoft.com/office/powerpoint/2010/main" xmlns="" val="1433498939"/>
+        <p14:creationId xmlns="" xmlns:p14="http://schemas.microsoft.com/office/powerpoint/2010/main" val="1433498939"/>
       </p:ext>
     </p:extLst>
   </p:cSld>
@@ -4905,7 +4905,7 @@
           <a:blip r:embed="rId13" cstate="print">
             <a:extLst>
               <a:ext uri="{28A0092B-C50C-407E-A947-70E740481C1C}">
-                <a14:useLocalDpi xmlns:a14="http://schemas.microsoft.com/office/drawing/2010/main" xmlns="" val="0"/>
+                <a14:useLocalDpi xmlns="" xmlns:a14="http://schemas.microsoft.com/office/drawing/2010/main" val="0"/>
               </a:ext>
             </a:extLst>
           </a:blip>
@@ -4926,7 +4926,7 @@
     </p:spTree>
     <p:extLst>
       <p:ext uri="{BB962C8B-B14F-4D97-AF65-F5344CB8AC3E}">
-        <p14:creationId xmlns:p14="http://schemas.microsoft.com/office/powerpoint/2010/main" xmlns="" val="2684825788"/>
+        <p14:creationId xmlns="" xmlns:p14="http://schemas.microsoft.com/office/powerpoint/2010/main" val="2684825788"/>
       </p:ext>
     </p:extLst>
   </p:cSld>
@@ -5299,7 +5299,7 @@
     </p:spTree>
     <p:extLst>
       <p:ext uri="{BB962C8B-B14F-4D97-AF65-F5344CB8AC3E}">
-        <p14:creationId xmlns:p14="http://schemas.microsoft.com/office/powerpoint/2010/main" xmlns="" val="3955344790"/>
+        <p14:creationId xmlns="" xmlns:p14="http://schemas.microsoft.com/office/powerpoint/2010/main" val="3955344790"/>
       </p:ext>
     </p:extLst>
   </p:cSld>
@@ -5307,7 +5307,7 @@
     <a:masterClrMapping/>
   </p:clrMapOvr>
   <mc:AlternateContent xmlns:mc="http://schemas.openxmlformats.org/markup-compatibility/2006">
-    <mc:Choice xmlns:p14="http://schemas.microsoft.com/office/powerpoint/2010/main" xmlns="" Requires="p14">
+    <mc:Choice xmlns="" xmlns:p14="http://schemas.microsoft.com/office/powerpoint/2010/main" Requires="p14">
       <p:transition spd="slow" p14:dur="2000"/>
     </mc:Choice>
     <mc:Fallback>
@@ -5480,7 +5480,7 @@
     </p:spTree>
     <p:extLst>
       <p:ext uri="{BB962C8B-B14F-4D97-AF65-F5344CB8AC3E}">
-        <p14:creationId xmlns:p14="http://schemas.microsoft.com/office/powerpoint/2010/main" xmlns="" val="3644490438"/>
+        <p14:creationId xmlns="" xmlns:p14="http://schemas.microsoft.com/office/powerpoint/2010/main" val="3644490438"/>
       </p:ext>
     </p:extLst>
   </p:cSld>
@@ -6222,7 +6222,7 @@
             <a:blip r:embed="rId2" cstate="print">
               <a:extLst>
                 <a:ext uri="{28A0092B-C50C-407E-A947-70E740481C1C}">
-                  <a14:useLocalDpi xmlns:a14="http://schemas.microsoft.com/office/drawing/2010/main" xmlns="" val="0"/>
+                  <a14:useLocalDpi xmlns="" xmlns:a14="http://schemas.microsoft.com/office/drawing/2010/main" val="0"/>
                 </a:ext>
               </a:extLst>
             </a:blip>
@@ -6252,7 +6252,7 @@
             <a:blip r:embed="rId3" cstate="print">
               <a:extLst>
                 <a:ext uri="{28A0092B-C50C-407E-A947-70E740481C1C}">
-                  <a14:useLocalDpi xmlns:a14="http://schemas.microsoft.com/office/drawing/2010/main" xmlns="" val="0"/>
+                  <a14:useLocalDpi xmlns="" xmlns:a14="http://schemas.microsoft.com/office/drawing/2010/main" val="0"/>
                 </a:ext>
               </a:extLst>
             </a:blip>
@@ -6300,7 +6300,7 @@
     </p:spTree>
     <p:extLst>
       <p:ext uri="{BB962C8B-B14F-4D97-AF65-F5344CB8AC3E}">
-        <p14:creationId xmlns:p14="http://schemas.microsoft.com/office/powerpoint/2010/main" xmlns="" val="1377264780"/>
+        <p14:creationId xmlns="" xmlns:p14="http://schemas.microsoft.com/office/powerpoint/2010/main" val="1377264780"/>
       </p:ext>
     </p:extLst>
   </p:cSld>
@@ -6475,7 +6475,7 @@
           <a:blip r:embed="rId2" cstate="print">
             <a:extLst>
               <a:ext uri="{28A0092B-C50C-407E-A947-70E740481C1C}">
-                <a14:useLocalDpi xmlns:a14="http://schemas.microsoft.com/office/drawing/2010/main" xmlns="" val="0"/>
+                <a14:useLocalDpi xmlns="" xmlns:a14="http://schemas.microsoft.com/office/drawing/2010/main" val="0"/>
               </a:ext>
             </a:extLst>
           </a:blip>
@@ -6505,7 +6505,7 @@
           <a:blip r:embed="rId3" cstate="print">
             <a:extLst>
               <a:ext uri="{28A0092B-C50C-407E-A947-70E740481C1C}">
-                <a14:useLocalDpi xmlns:a14="http://schemas.microsoft.com/office/drawing/2010/main" xmlns="" val="0"/>
+                <a14:useLocalDpi xmlns="" xmlns:a14="http://schemas.microsoft.com/office/drawing/2010/main" val="0"/>
               </a:ext>
             </a:extLst>
           </a:blip>
@@ -6763,7 +6763,7 @@
     </p:spTree>
     <p:extLst>
       <p:ext uri="{BB962C8B-B14F-4D97-AF65-F5344CB8AC3E}">
-        <p14:creationId xmlns:p14="http://schemas.microsoft.com/office/powerpoint/2010/main" xmlns="" val="3336203041"/>
+        <p14:creationId xmlns="" xmlns:p14="http://schemas.microsoft.com/office/powerpoint/2010/main" val="3336203041"/>
       </p:ext>
     </p:extLst>
   </p:cSld>
@@ -7158,7 +7158,7 @@
           <a:blip r:embed="rId2" cstate="print">
             <a:extLst>
               <a:ext uri="{28A0092B-C50C-407E-A947-70E740481C1C}">
-                <a14:useLocalDpi xmlns:a14="http://schemas.microsoft.com/office/drawing/2010/main" xmlns="" val="0"/>
+                <a14:useLocalDpi xmlns="" xmlns:a14="http://schemas.microsoft.com/office/drawing/2010/main" val="0"/>
               </a:ext>
             </a:extLst>
           </a:blip>
@@ -7188,7 +7188,7 @@
           <a:blip r:embed="rId3" cstate="print">
             <a:extLst>
               <a:ext uri="{28A0092B-C50C-407E-A947-70E740481C1C}">
-                <a14:useLocalDpi xmlns:a14="http://schemas.microsoft.com/office/drawing/2010/main" xmlns="" val="0"/>
+                <a14:useLocalDpi xmlns="" xmlns:a14="http://schemas.microsoft.com/office/drawing/2010/main" val="0"/>
               </a:ext>
             </a:extLst>
           </a:blip>
@@ -7350,7 +7350,7 @@
     </p:spTree>
     <p:extLst>
       <p:ext uri="{BB962C8B-B14F-4D97-AF65-F5344CB8AC3E}">
-        <p14:creationId xmlns:p14="http://schemas.microsoft.com/office/powerpoint/2010/main" xmlns="" val="864210357"/>
+        <p14:creationId xmlns="" xmlns:p14="http://schemas.microsoft.com/office/powerpoint/2010/main" val="864210357"/>
       </p:ext>
     </p:extLst>
   </p:cSld>
@@ -7624,7 +7624,7 @@
           <a:blip r:embed="rId2" cstate="print">
             <a:extLst>
               <a:ext uri="{28A0092B-C50C-407E-A947-70E740481C1C}">
-                <a14:useLocalDpi xmlns:a14="http://schemas.microsoft.com/office/drawing/2010/main" xmlns="" val="0"/>
+                <a14:useLocalDpi xmlns="" xmlns:a14="http://schemas.microsoft.com/office/drawing/2010/main" val="0"/>
               </a:ext>
             </a:extLst>
           </a:blip>
@@ -7654,7 +7654,7 @@
           <a:blip r:embed="rId3" cstate="print">
             <a:extLst>
               <a:ext uri="{28A0092B-C50C-407E-A947-70E740481C1C}">
-                <a14:useLocalDpi xmlns:a14="http://schemas.microsoft.com/office/drawing/2010/main" xmlns="" val="0"/>
+                <a14:useLocalDpi xmlns="" xmlns:a14="http://schemas.microsoft.com/office/drawing/2010/main" val="0"/>
               </a:ext>
             </a:extLst>
           </a:blip>
@@ -8366,7 +8366,7 @@
     </p:spTree>
     <p:extLst>
       <p:ext uri="{BB962C8B-B14F-4D97-AF65-F5344CB8AC3E}">
-        <p14:creationId xmlns:p14="http://schemas.microsoft.com/office/powerpoint/2010/main" xmlns="" val="3336203041"/>
+        <p14:creationId xmlns="" xmlns:p14="http://schemas.microsoft.com/office/powerpoint/2010/main" val="3336203041"/>
       </p:ext>
     </p:extLst>
   </p:cSld>
@@ -9058,7 +9058,7 @@
     </p:spTree>
     <p:extLst>
       <p:ext uri="{BB962C8B-B14F-4D97-AF65-F5344CB8AC3E}">
-        <p14:creationId xmlns:p14="http://schemas.microsoft.com/office/powerpoint/2010/main" xmlns="" val="3627640579"/>
+        <p14:creationId xmlns="" xmlns:p14="http://schemas.microsoft.com/office/powerpoint/2010/main" val="3627640579"/>
       </p:ext>
     </p:extLst>
   </p:cSld>
@@ -9268,7 +9268,7 @@
     </p:spTree>
     <p:extLst>
       <p:ext uri="{BB962C8B-B14F-4D97-AF65-F5344CB8AC3E}">
-        <p14:creationId xmlns:p14="http://schemas.microsoft.com/office/powerpoint/2010/main" xmlns="" val="171061288"/>
+        <p14:creationId xmlns="" xmlns:p14="http://schemas.microsoft.com/office/powerpoint/2010/main" val="171061288"/>
       </p:ext>
     </p:extLst>
   </p:cSld>
@@ -9545,7 +9545,7 @@
     </p:spTree>
     <p:extLst>
       <p:ext uri="{BB962C8B-B14F-4D97-AF65-F5344CB8AC3E}">
-        <p14:creationId xmlns:p14="http://schemas.microsoft.com/office/powerpoint/2010/main" xmlns="" val="394514968"/>
+        <p14:creationId xmlns="" xmlns:p14="http://schemas.microsoft.com/office/powerpoint/2010/main" val="394514968"/>
       </p:ext>
     </p:extLst>
   </p:cSld>
@@ -9815,7 +9815,7 @@
           <a:blip r:embed="rId3" cstate="print">
             <a:extLst>
               <a:ext uri="{28A0092B-C50C-407E-A947-70E740481C1C}">
-                <a14:useLocalDpi xmlns:a14="http://schemas.microsoft.com/office/drawing/2010/main" xmlns=""/>
+                <a14:useLocalDpi xmlns="" xmlns:a14="http://schemas.microsoft.com/office/drawing/2010/main"/>
               </a:ext>
             </a:extLst>
           </a:blip>
@@ -9840,7 +9840,7 @@
     </p:spTree>
     <p:extLst>
       <p:ext uri="{BB962C8B-B14F-4D97-AF65-F5344CB8AC3E}">
-        <p14:creationId xmlns:p14="http://schemas.microsoft.com/office/powerpoint/2010/main" xmlns="" val="1630604182"/>
+        <p14:creationId xmlns="" xmlns:p14="http://schemas.microsoft.com/office/powerpoint/2010/main" val="1630604182"/>
       </p:ext>
     </p:extLst>
   </p:cSld>
@@ -10051,7 +10051,7 @@
     </p:spTree>
     <p:extLst>
       <p:ext uri="{BB962C8B-B14F-4D97-AF65-F5344CB8AC3E}">
-        <p14:creationId xmlns:p14="http://schemas.microsoft.com/office/powerpoint/2010/main" xmlns="" val="3593113261"/>
+        <p14:creationId xmlns="" xmlns:p14="http://schemas.microsoft.com/office/powerpoint/2010/main" val="3593113261"/>
       </p:ext>
     </p:extLst>
   </p:cSld>
@@ -10281,7 +10281,7 @@
     </p:spTree>
     <p:extLst>
       <p:ext uri="{BB962C8B-B14F-4D97-AF65-F5344CB8AC3E}">
-        <p14:creationId xmlns:p14="http://schemas.microsoft.com/office/powerpoint/2010/main" xmlns="" val="451913240"/>
+        <p14:creationId xmlns="" xmlns:p14="http://schemas.microsoft.com/office/powerpoint/2010/main" val="451913240"/>
       </p:ext>
     </p:extLst>
   </p:cSld>
@@ -10551,7 +10551,7 @@
     </p:spTree>
     <p:extLst>
       <p:ext uri="{BB962C8B-B14F-4D97-AF65-F5344CB8AC3E}">
-        <p14:creationId xmlns:p14="http://schemas.microsoft.com/office/powerpoint/2010/main" xmlns="" val="2009636028"/>
+        <p14:creationId xmlns="" xmlns:p14="http://schemas.microsoft.com/office/powerpoint/2010/main" val="2009636028"/>
       </p:ext>
     </p:extLst>
   </p:cSld>
@@ -10813,7 +10813,7 @@
     </p:spTree>
     <p:extLst>
       <p:ext uri="{BB962C8B-B14F-4D97-AF65-F5344CB8AC3E}">
-        <p14:creationId xmlns:p14="http://schemas.microsoft.com/office/powerpoint/2010/main" xmlns="" val="1131833659"/>
+        <p14:creationId xmlns="" xmlns:p14="http://schemas.microsoft.com/office/powerpoint/2010/main" val="1131833659"/>
       </p:ext>
     </p:extLst>
   </p:cSld>
@@ -10882,7 +10882,7 @@
           <a:blip r:embed="rId3" cstate="print">
             <a:extLst>
               <a:ext uri="{28A0092B-C50C-407E-A947-70E740481C1C}">
-                <a14:useLocalDpi xmlns:a14="http://schemas.microsoft.com/office/drawing/2010/main" xmlns="" val="0"/>
+                <a14:useLocalDpi xmlns="" xmlns:a14="http://schemas.microsoft.com/office/drawing/2010/main" val="0"/>
               </a:ext>
             </a:extLst>
           </a:blip>
@@ -10903,7 +10903,7 @@
     </p:spTree>
     <p:extLst>
       <p:ext uri="{BB962C8B-B14F-4D97-AF65-F5344CB8AC3E}">
-        <p14:creationId xmlns:p14="http://schemas.microsoft.com/office/powerpoint/2010/main" xmlns="" val="1848404178"/>
+        <p14:creationId xmlns="" xmlns:p14="http://schemas.microsoft.com/office/powerpoint/2010/main" val="1848404178"/>
       </p:ext>
     </p:extLst>
   </p:cSld>
@@ -11088,7 +11088,7 @@
     </p:spTree>
     <p:extLst>
       <p:ext uri="{BB962C8B-B14F-4D97-AF65-F5344CB8AC3E}">
-        <p14:creationId xmlns:p14="http://schemas.microsoft.com/office/powerpoint/2010/main" xmlns="" val="1155854373"/>
+        <p14:creationId xmlns="" xmlns:p14="http://schemas.microsoft.com/office/powerpoint/2010/main" val="1155854373"/>
       </p:ext>
     </p:extLst>
   </p:cSld>
@@ -11554,7 +11554,7 @@
     </p:spTree>
     <p:extLst>
       <p:ext uri="{BB962C8B-B14F-4D97-AF65-F5344CB8AC3E}">
-        <p14:creationId xmlns:p14="http://schemas.microsoft.com/office/powerpoint/2010/main" xmlns="" val="1027356186"/>
+        <p14:creationId xmlns="" xmlns:p14="http://schemas.microsoft.com/office/powerpoint/2010/main" val="1027356186"/>
       </p:ext>
     </p:extLst>
   </p:cSld>
@@ -11623,7 +11623,7 @@
           <a:blip r:embed="rId2" cstate="print">
             <a:extLst>
               <a:ext uri="{28A0092B-C50C-407E-A947-70E740481C1C}">
-                <a14:useLocalDpi xmlns:a14="http://schemas.microsoft.com/office/drawing/2010/main" xmlns="" val="0"/>
+                <a14:useLocalDpi xmlns="" xmlns:a14="http://schemas.microsoft.com/office/drawing/2010/main" val="0"/>
               </a:ext>
             </a:extLst>
           </a:blip>
@@ -11653,7 +11653,7 @@
           <a:blip r:embed="rId3" cstate="print">
             <a:extLst>
               <a:ext uri="{28A0092B-C50C-407E-A947-70E740481C1C}">
-                <a14:useLocalDpi xmlns:a14="http://schemas.microsoft.com/office/drawing/2010/main" xmlns="" val="0"/>
+                <a14:useLocalDpi xmlns="" xmlns:a14="http://schemas.microsoft.com/office/drawing/2010/main" val="0"/>
               </a:ext>
             </a:extLst>
           </a:blip>
@@ -11677,7 +11677,7 @@
     </p:spTree>
     <p:extLst>
       <p:ext uri="{BB962C8B-B14F-4D97-AF65-F5344CB8AC3E}">
-        <p14:creationId xmlns:p14="http://schemas.microsoft.com/office/powerpoint/2010/main" xmlns="" val="2369171751"/>
+        <p14:creationId xmlns="" xmlns:p14="http://schemas.microsoft.com/office/powerpoint/2010/main" val="2369171751"/>
       </p:ext>
     </p:extLst>
   </p:cSld>
@@ -11798,7 +11798,7 @@
           <a:blip r:embed="rId4" cstate="print">
             <a:extLst>
               <a:ext uri="{28A0092B-C50C-407E-A947-70E740481C1C}">
-                <a14:useLocalDpi xmlns:a14="http://schemas.microsoft.com/office/drawing/2010/main" xmlns="" val="0"/>
+                <a14:useLocalDpi xmlns="" xmlns:a14="http://schemas.microsoft.com/office/drawing/2010/main" val="0"/>
               </a:ext>
             </a:extLst>
           </a:blip>
@@ -11914,7 +11914,7 @@
     </p:spTree>
     <p:extLst>
       <p:ext uri="{BB962C8B-B14F-4D97-AF65-F5344CB8AC3E}">
-        <p14:creationId xmlns:p14="http://schemas.microsoft.com/office/powerpoint/2010/main" xmlns="" val="3216378839"/>
+        <p14:creationId xmlns="" xmlns:p14="http://schemas.microsoft.com/office/powerpoint/2010/main" val="3216378839"/>
       </p:ext>
     </p:extLst>
   </p:cSld>
@@ -12233,7 +12233,7 @@
           <a:blip r:embed="rId2" cstate="print">
             <a:extLst>
               <a:ext uri="{28A0092B-C50C-407E-A947-70E740481C1C}">
-                <a14:useLocalDpi xmlns:a14="http://schemas.microsoft.com/office/drawing/2010/main" xmlns="" val="0"/>
+                <a14:useLocalDpi xmlns="" xmlns:a14="http://schemas.microsoft.com/office/drawing/2010/main" val="0"/>
               </a:ext>
             </a:extLst>
           </a:blip>
@@ -12342,7 +12342,7 @@
     </p:spTree>
     <p:extLst>
       <p:ext uri="{BB962C8B-B14F-4D97-AF65-F5344CB8AC3E}">
-        <p14:creationId xmlns:p14="http://schemas.microsoft.com/office/powerpoint/2010/main" xmlns="" val="2527117896"/>
+        <p14:creationId xmlns="" xmlns:p14="http://schemas.microsoft.com/office/powerpoint/2010/main" val="2527117896"/>
       </p:ext>
     </p:extLst>
   </p:cSld>
@@ -13056,7 +13056,7 @@
     </p:spTree>
     <p:extLst>
       <p:ext uri="{BB962C8B-B14F-4D97-AF65-F5344CB8AC3E}">
-        <p14:creationId xmlns:p14="http://schemas.microsoft.com/office/powerpoint/2010/main" xmlns="" val="1994743043"/>
+        <p14:creationId xmlns="" xmlns:p14="http://schemas.microsoft.com/office/powerpoint/2010/main" val="1994743043"/>
       </p:ext>
     </p:extLst>
   </p:cSld>
@@ -13100,7 +13100,12 @@
             <p:ph type="title"/>
           </p:nvPr>
         </p:nvSpPr>
-        <p:spPr/>
+        <p:spPr>
+          <a:xfrm>
+            <a:off x="457200" y="342900"/>
+            <a:ext cx="8229600" cy="857250"/>
+          </a:xfrm>
+        </p:spPr>
         <p:txBody>
           <a:bodyPr>
             <a:normAutofit fontScale="90000"/>
@@ -13132,7 +13137,12 @@
             <p:ph idx="1"/>
           </p:nvPr>
         </p:nvSpPr>
-        <p:spPr/>
+        <p:spPr>
+          <a:xfrm>
+            <a:off x="457200" y="1539478"/>
+            <a:ext cx="8229600" cy="3394472"/>
+          </a:xfrm>
+        </p:spPr>
         <p:txBody>
           <a:bodyPr>
             <a:normAutofit fontScale="85000" lnSpcReduction="20000"/>
@@ -13242,7 +13252,7 @@
     </p:spTree>
     <p:extLst>
       <p:ext uri="{BB962C8B-B14F-4D97-AF65-F5344CB8AC3E}">
-        <p14:creationId xmlns:p14="http://schemas.microsoft.com/office/powerpoint/2010/main" xmlns="" val="3098398089"/>
+        <p14:creationId xmlns="" xmlns:p14="http://schemas.microsoft.com/office/powerpoint/2010/main" val="3098398089"/>
       </p:ext>
     </p:extLst>
   </p:cSld>
@@ -13523,7 +13533,7 @@
     </p:spTree>
     <p:extLst>
       <p:ext uri="{BB962C8B-B14F-4D97-AF65-F5344CB8AC3E}">
-        <p14:creationId xmlns:p14="http://schemas.microsoft.com/office/powerpoint/2010/main" xmlns="" val="3449390454"/>
+        <p14:creationId xmlns="" xmlns:p14="http://schemas.microsoft.com/office/powerpoint/2010/main" val="3449390454"/>
       </p:ext>
     </p:extLst>
   </p:cSld>
@@ -13802,20 +13812,12 @@
               <a:rPr lang="en-US" sz="3600" dirty="0" smtClean="0"/>
               <a:t>Code generation </a:t>
             </a:r>
-            <a:r>
-              <a:rPr lang="en-US" sz="3600" dirty="0" smtClean="0"/>
-              <a:t/>
-            </a:r>
             <a:br>
               <a:rPr lang="en-US" sz="3600" dirty="0" smtClean="0"/>
             </a:br>
             <a:r>
               <a:rPr lang="en-US" sz="3600" dirty="0" smtClean="0"/>
-              <a:t>using </a:t>
-            </a:r>
-            <a:r>
-              <a:rPr lang="en-US" sz="3600" dirty="0" smtClean="0"/>
-              <a:t>a maven custom plugin</a:t>
+              <a:t>using a maven custom plugin</a:t>
             </a:r>
             <a:endParaRPr lang="en-US" sz="3600" dirty="0"/>
           </a:p>
@@ -14239,7 +14241,7 @@
     </p:spTree>
     <p:extLst>
       <p:ext uri="{BB962C8B-B14F-4D97-AF65-F5344CB8AC3E}">
-        <p14:creationId xmlns:p14="http://schemas.microsoft.com/office/powerpoint/2010/main" xmlns="" val="4006469721"/>
+        <p14:creationId xmlns="" xmlns:p14="http://schemas.microsoft.com/office/powerpoint/2010/main" val="4006469721"/>
       </p:ext>
     </p:extLst>
   </p:cSld>
@@ -14520,13 +14522,8 @@
             </a:pPr>
             <a:r>
               <a:rPr lang="en-US" sz="1800" dirty="0" smtClean="0"/>
-              <a:t>    </a:t>
-            </a:r>
-            <a:r>
-              <a:rPr lang="en-US" sz="1800" dirty="0" smtClean="0"/>
-              <a:t>}</a:t>
-            </a:r>
-            <a:endParaRPr lang="en-US" sz="1800" dirty="0" smtClean="0"/>
+              <a:t>    }</a:t>
+            </a:r>
           </a:p>
           <a:p>
             <a:r>
@@ -14546,7 +14543,7 @@
     </p:spTree>
     <p:extLst>
       <p:ext uri="{BB962C8B-B14F-4D97-AF65-F5344CB8AC3E}">
-        <p14:creationId xmlns:p14="http://schemas.microsoft.com/office/powerpoint/2010/main" xmlns="" val="1678422724"/>
+        <p14:creationId xmlns="" xmlns:p14="http://schemas.microsoft.com/office/powerpoint/2010/main" val="1678422724"/>
       </p:ext>
     </p:extLst>
   </p:cSld>
@@ -15160,7 +15157,7 @@
     </p:spTree>
     <p:extLst>
       <p:ext uri="{BB962C8B-B14F-4D97-AF65-F5344CB8AC3E}">
-        <p14:creationId xmlns:p14="http://schemas.microsoft.com/office/powerpoint/2010/main" xmlns="" val="2792941284"/>
+        <p14:creationId xmlns="" xmlns:p14="http://schemas.microsoft.com/office/powerpoint/2010/main" val="2792941284"/>
       </p:ext>
     </p:extLst>
   </p:cSld>
@@ -15624,7 +15621,7 @@
     </p:spTree>
     <p:extLst>
       <p:ext uri="{BB962C8B-B14F-4D97-AF65-F5344CB8AC3E}">
-        <p14:creationId xmlns:p14="http://schemas.microsoft.com/office/powerpoint/2010/main" xmlns="" val="3220083538"/>
+        <p14:creationId xmlns="" xmlns:p14="http://schemas.microsoft.com/office/powerpoint/2010/main" val="3220083538"/>
       </p:ext>
     </p:extLst>
   </p:cSld>
@@ -15843,7 +15840,7 @@
     </p:spTree>
     <p:extLst>
       <p:ext uri="{BB962C8B-B14F-4D97-AF65-F5344CB8AC3E}">
-        <p14:creationId xmlns:p14="http://schemas.microsoft.com/office/powerpoint/2010/main" xmlns="" val="856396653"/>
+        <p14:creationId xmlns="" xmlns:p14="http://schemas.microsoft.com/office/powerpoint/2010/main" val="856396653"/>
       </p:ext>
     </p:extLst>
   </p:cSld>
@@ -16006,7 +16003,7 @@
     </p:spTree>
     <p:extLst>
       <p:ext uri="{BB962C8B-B14F-4D97-AF65-F5344CB8AC3E}">
-        <p14:creationId xmlns:p14="http://schemas.microsoft.com/office/powerpoint/2010/main" xmlns="" val="3312784383"/>
+        <p14:creationId xmlns="" xmlns:p14="http://schemas.microsoft.com/office/powerpoint/2010/main" val="3312784383"/>
       </p:ext>
     </p:extLst>
   </p:cSld>
@@ -16224,7 +16221,7 @@
     </p:spTree>
     <p:extLst>
       <p:ext uri="{BB962C8B-B14F-4D97-AF65-F5344CB8AC3E}">
-        <p14:creationId xmlns:p14="http://schemas.microsoft.com/office/powerpoint/2010/main" xmlns="" val="3443329555"/>
+        <p14:creationId xmlns="" xmlns:p14="http://schemas.microsoft.com/office/powerpoint/2010/main" val="3443329555"/>
       </p:ext>
     </p:extLst>
   </p:cSld>
@@ -16736,7 +16733,7 @@
     </p:spTree>
     <p:extLst>
       <p:ext uri="{BB962C8B-B14F-4D97-AF65-F5344CB8AC3E}">
-        <p14:creationId xmlns:p14="http://schemas.microsoft.com/office/powerpoint/2010/main" xmlns="" val="1556099287"/>
+        <p14:creationId xmlns="" xmlns:p14="http://schemas.microsoft.com/office/powerpoint/2010/main" val="1556099287"/>
       </p:ext>
     </p:extLst>
   </p:cSld>
@@ -17089,7 +17086,7 @@
     </p:spTree>
     <p:extLst>
       <p:ext uri="{BB962C8B-B14F-4D97-AF65-F5344CB8AC3E}">
-        <p14:creationId xmlns:p14="http://schemas.microsoft.com/office/powerpoint/2010/main" xmlns="" val="2948210574"/>
+        <p14:creationId xmlns="" xmlns:p14="http://schemas.microsoft.com/office/powerpoint/2010/main" val="2948210574"/>
       </p:ext>
     </p:extLst>
   </p:cSld>
@@ -17734,7 +17731,7 @@
     </p:spTree>
     <p:extLst>
       <p:ext uri="{BB962C8B-B14F-4D97-AF65-F5344CB8AC3E}">
-        <p14:creationId xmlns:p14="http://schemas.microsoft.com/office/powerpoint/2010/main" xmlns="" val="977874982"/>
+        <p14:creationId xmlns="" xmlns:p14="http://schemas.microsoft.com/office/powerpoint/2010/main" val="977874982"/>
       </p:ext>
     </p:extLst>
   </p:cSld>
@@ -17975,7 +17972,7 @@
           <p:nvPr>
             <p:extLst>
               <p:ext uri="{D42A27DB-BD31-4B8C-83A1-F6EECF244321}">
-                <p14:modId xmlns:p14="http://schemas.microsoft.com/office/powerpoint/2010/main" xmlns="" val="2181104498"/>
+                <p14:modId xmlns="" xmlns:p14="http://schemas.microsoft.com/office/powerpoint/2010/main" val="2181104498"/>
               </p:ext>
             </p:extLst>
           </p:nvPr>
@@ -18959,7 +18956,7 @@
     </p:spTree>
     <p:extLst>
       <p:ext uri="{BB962C8B-B14F-4D97-AF65-F5344CB8AC3E}">
-        <p14:creationId xmlns:p14="http://schemas.microsoft.com/office/powerpoint/2010/main" xmlns="" val="2197364214"/>
+        <p14:creationId xmlns="" xmlns:p14="http://schemas.microsoft.com/office/powerpoint/2010/main" val="2197364214"/>
       </p:ext>
     </p:extLst>
   </p:cSld>
@@ -19135,7 +19132,7 @@
     </p:spTree>
     <p:extLst>
       <p:ext uri="{BB962C8B-B14F-4D97-AF65-F5344CB8AC3E}">
-        <p14:creationId xmlns:p14="http://schemas.microsoft.com/office/powerpoint/2010/main" xmlns="" val="2092776985"/>
+        <p14:creationId xmlns="" xmlns:p14="http://schemas.microsoft.com/office/powerpoint/2010/main" val="2092776985"/>
       </p:ext>
     </p:extLst>
   </p:cSld>
@@ -19355,7 +19352,7 @@
     </p:spTree>
     <p:extLst>
       <p:ext uri="{BB962C8B-B14F-4D97-AF65-F5344CB8AC3E}">
-        <p14:creationId xmlns:p14="http://schemas.microsoft.com/office/powerpoint/2010/main" xmlns="" val="318706902"/>
+        <p14:creationId xmlns="" xmlns:p14="http://schemas.microsoft.com/office/powerpoint/2010/main" val="318706902"/>
       </p:ext>
     </p:extLst>
   </p:cSld>
@@ -19438,7 +19435,7 @@
           <p:nvPr>
             <p:extLst>
               <p:ext uri="{D42A27DB-BD31-4B8C-83A1-F6EECF244321}">
-                <p14:modId xmlns:p14="http://schemas.microsoft.com/office/powerpoint/2010/main" xmlns="" val="3075550189"/>
+                <p14:modId xmlns="" xmlns:p14="http://schemas.microsoft.com/office/powerpoint/2010/main" val="3075550189"/>
               </p:ext>
             </p:extLst>
           </p:nvPr>
@@ -19809,7 +19806,7 @@
           <a:blip r:embed="rId3" cstate="print">
             <a:extLst>
               <a:ext uri="{28A0092B-C50C-407E-A947-70E740481C1C}">
-                <a14:useLocalDpi xmlns:a14="http://schemas.microsoft.com/office/drawing/2010/main" xmlns="" val="0"/>
+                <a14:useLocalDpi xmlns="" xmlns:a14="http://schemas.microsoft.com/office/drawing/2010/main" val="0"/>
               </a:ext>
             </a:extLst>
           </a:blip>
@@ -19839,7 +19836,7 @@
           <a:blip r:embed="rId4" cstate="print">
             <a:extLst>
               <a:ext uri="{28A0092B-C50C-407E-A947-70E740481C1C}">
-                <a14:useLocalDpi xmlns:a14="http://schemas.microsoft.com/office/drawing/2010/main" xmlns="" val="0"/>
+                <a14:useLocalDpi xmlns="" xmlns:a14="http://schemas.microsoft.com/office/drawing/2010/main" val="0"/>
               </a:ext>
             </a:extLst>
           </a:blip>
@@ -19869,7 +19866,7 @@
           <a:blip r:embed="rId5" cstate="print">
             <a:extLst>
               <a:ext uri="{28A0092B-C50C-407E-A947-70E740481C1C}">
-                <a14:useLocalDpi xmlns:a14="http://schemas.microsoft.com/office/drawing/2010/main" xmlns="" val="0"/>
+                <a14:useLocalDpi xmlns="" xmlns:a14="http://schemas.microsoft.com/office/drawing/2010/main" val="0"/>
               </a:ext>
             </a:extLst>
           </a:blip>
@@ -19899,7 +19896,7 @@
           <a:blip r:embed="rId6" cstate="print">
             <a:extLst>
               <a:ext uri="{28A0092B-C50C-407E-A947-70E740481C1C}">
-                <a14:useLocalDpi xmlns:a14="http://schemas.microsoft.com/office/drawing/2010/main" xmlns="" val="0"/>
+                <a14:useLocalDpi xmlns="" xmlns:a14="http://schemas.microsoft.com/office/drawing/2010/main" val="0"/>
               </a:ext>
             </a:extLst>
           </a:blip>
@@ -19929,7 +19926,7 @@
           <a:blip r:embed="rId7" cstate="print">
             <a:extLst>
               <a:ext uri="{28A0092B-C50C-407E-A947-70E740481C1C}">
-                <a14:useLocalDpi xmlns:a14="http://schemas.microsoft.com/office/drawing/2010/main" xmlns="" val="0"/>
+                <a14:useLocalDpi xmlns="" xmlns:a14="http://schemas.microsoft.com/office/drawing/2010/main" val="0"/>
               </a:ext>
             </a:extLst>
           </a:blip>
@@ -19959,7 +19956,7 @@
           <a:blip r:embed="rId8" cstate="print">
             <a:extLst>
               <a:ext uri="{28A0092B-C50C-407E-A947-70E740481C1C}">
-                <a14:useLocalDpi xmlns:a14="http://schemas.microsoft.com/office/drawing/2010/main" xmlns="" val="0"/>
+                <a14:useLocalDpi xmlns="" xmlns:a14="http://schemas.microsoft.com/office/drawing/2010/main" val="0"/>
               </a:ext>
             </a:extLst>
           </a:blip>
@@ -19980,7 +19977,7 @@
     </p:spTree>
     <p:extLst>
       <p:ext uri="{BB962C8B-B14F-4D97-AF65-F5344CB8AC3E}">
-        <p14:creationId xmlns:p14="http://schemas.microsoft.com/office/powerpoint/2010/main" xmlns="" val="949325302"/>
+        <p14:creationId xmlns="" xmlns:p14="http://schemas.microsoft.com/office/powerpoint/2010/main" val="949325302"/>
       </p:ext>
     </p:extLst>
   </p:cSld>
@@ -20661,7 +20658,7 @@
     </p:spTree>
     <p:extLst>
       <p:ext uri="{BB962C8B-B14F-4D97-AF65-F5344CB8AC3E}">
-        <p14:creationId xmlns:p14="http://schemas.microsoft.com/office/powerpoint/2010/main" xmlns="" val="1728169033"/>
+        <p14:creationId xmlns="" xmlns:p14="http://schemas.microsoft.com/office/powerpoint/2010/main" val="1728169033"/>
       </p:ext>
     </p:extLst>
   </p:cSld>
@@ -20906,7 +20903,7 @@
     </p:spTree>
     <p:extLst>
       <p:ext uri="{BB962C8B-B14F-4D97-AF65-F5344CB8AC3E}">
-        <p14:creationId xmlns:p14="http://schemas.microsoft.com/office/powerpoint/2010/main" xmlns="" val="2834344091"/>
+        <p14:creationId xmlns="" xmlns:p14="http://schemas.microsoft.com/office/powerpoint/2010/main" val="2834344091"/>
       </p:ext>
     </p:extLst>
   </p:cSld>
@@ -21298,7 +21295,7 @@
           <p:nvPr>
             <p:extLst>
               <p:ext uri="{D42A27DB-BD31-4B8C-83A1-F6EECF244321}">
-                <p14:modId xmlns:p14="http://schemas.microsoft.com/office/powerpoint/2010/main" xmlns="" val="3204736979"/>
+                <p14:modId xmlns="" xmlns:p14="http://schemas.microsoft.com/office/powerpoint/2010/main" val="3204736979"/>
               </p:ext>
             </p:extLst>
           </p:nvPr>
@@ -21603,13 +21600,8 @@
             </a:r>
             <a:r>
               <a:rPr lang="en-US" sz="2000" dirty="0" smtClean="0"/>
-              <a:t> the dependency </a:t>
-            </a:r>
-            <a:r>
-              <a:rPr lang="en-US" sz="2000" dirty="0" smtClean="0"/>
-              <a:t>graph	</a:t>
-            </a:r>
-            <a:endParaRPr lang="en-US" sz="2000" dirty="0" smtClean="0"/>
+              <a:t> the dependency graph	</a:t>
+            </a:r>
           </a:p>
           <a:p>
             <a:pPr marL="285750" indent="-285750">
@@ -21631,7 +21623,7 @@
     </p:spTree>
     <p:extLst>
       <p:ext uri="{BB962C8B-B14F-4D97-AF65-F5344CB8AC3E}">
-        <p14:creationId xmlns:p14="http://schemas.microsoft.com/office/powerpoint/2010/main" xmlns="" val="3195513628"/>
+        <p14:creationId xmlns="" xmlns:p14="http://schemas.microsoft.com/office/powerpoint/2010/main" val="3195513628"/>
       </p:ext>
     </p:extLst>
   </p:cSld>
@@ -21769,7 +21761,7 @@
     </p:spTree>
     <p:extLst>
       <p:ext uri="{BB962C8B-B14F-4D97-AF65-F5344CB8AC3E}">
-        <p14:creationId xmlns:p14="http://schemas.microsoft.com/office/powerpoint/2010/main" xmlns="" val="2674396190"/>
+        <p14:creationId xmlns="" xmlns:p14="http://schemas.microsoft.com/office/powerpoint/2010/main" val="2674396190"/>
       </p:ext>
     </p:extLst>
   </p:cSld>
@@ -21911,7 +21903,7 @@
     </p:spTree>
     <p:extLst>
       <p:ext uri="{BB962C8B-B14F-4D97-AF65-F5344CB8AC3E}">
-        <p14:creationId xmlns:p14="http://schemas.microsoft.com/office/powerpoint/2010/main" xmlns="" val="2713826086"/>
+        <p14:creationId xmlns="" xmlns:p14="http://schemas.microsoft.com/office/powerpoint/2010/main" val="2713826086"/>
       </p:ext>
     </p:extLst>
   </p:cSld>
@@ -22103,7 +22095,7 @@
     </p:spTree>
     <p:extLst>
       <p:ext uri="{BB962C8B-B14F-4D97-AF65-F5344CB8AC3E}">
-        <p14:creationId xmlns:p14="http://schemas.microsoft.com/office/powerpoint/2010/main" xmlns="" val="714747940"/>
+        <p14:creationId xmlns="" xmlns:p14="http://schemas.microsoft.com/office/powerpoint/2010/main" val="714747940"/>
       </p:ext>
     </p:extLst>
   </p:cSld>
@@ -22642,7 +22634,7 @@
     </p:spTree>
     <p:extLst>
       <p:ext uri="{BB962C8B-B14F-4D97-AF65-F5344CB8AC3E}">
-        <p14:creationId xmlns:p14="http://schemas.microsoft.com/office/powerpoint/2010/main" xmlns="" val="3760395846"/>
+        <p14:creationId xmlns="" xmlns:p14="http://schemas.microsoft.com/office/powerpoint/2010/main" val="3760395846"/>
       </p:ext>
     </p:extLst>
   </p:cSld>
@@ -23475,7 +23467,7 @@
     </p:spTree>
     <p:extLst>
       <p:ext uri="{BB962C8B-B14F-4D97-AF65-F5344CB8AC3E}">
-        <p14:creationId xmlns:p14="http://schemas.microsoft.com/office/powerpoint/2010/main" xmlns="" val="1422967000"/>
+        <p14:creationId xmlns="" xmlns:p14="http://schemas.microsoft.com/office/powerpoint/2010/main" val="1422967000"/>
       </p:ext>
     </p:extLst>
   </p:cSld>
@@ -23628,7 +23620,7 @@
     </p:spTree>
     <p:extLst>
       <p:ext uri="{BB962C8B-B14F-4D97-AF65-F5344CB8AC3E}">
-        <p14:creationId xmlns:p14="http://schemas.microsoft.com/office/powerpoint/2010/main" xmlns="" val="2654585083"/>
+        <p14:creationId xmlns="" xmlns:p14="http://schemas.microsoft.com/office/powerpoint/2010/main" val="2654585083"/>
       </p:ext>
     </p:extLst>
   </p:cSld>
@@ -23790,7 +23782,7 @@
     </p:spTree>
     <p:extLst>
       <p:ext uri="{BB962C8B-B14F-4D97-AF65-F5344CB8AC3E}">
-        <p14:creationId xmlns:p14="http://schemas.microsoft.com/office/powerpoint/2010/main" xmlns="" val="1683021932"/>
+        <p14:creationId xmlns="" xmlns:p14="http://schemas.microsoft.com/office/powerpoint/2010/main" val="1683021932"/>
       </p:ext>
     </p:extLst>
   </p:cSld>
@@ -23864,7 +23856,7 @@
           <a:blip r:embed="rId2" cstate="print">
             <a:extLst>
               <a:ext uri="{28A0092B-C50C-407E-A947-70E740481C1C}">
-                <a14:useLocalDpi xmlns:a14="http://schemas.microsoft.com/office/drawing/2010/main" xmlns="" val="0"/>
+                <a14:useLocalDpi xmlns="" xmlns:a14="http://schemas.microsoft.com/office/drawing/2010/main" val="0"/>
               </a:ext>
             </a:extLst>
           </a:blip>
@@ -24500,7 +24492,7 @@
     </p:spTree>
     <p:extLst>
       <p:ext uri="{BB962C8B-B14F-4D97-AF65-F5344CB8AC3E}">
-        <p14:creationId xmlns:p14="http://schemas.microsoft.com/office/powerpoint/2010/main" xmlns="" val="3007787296"/>
+        <p14:creationId xmlns="" xmlns:p14="http://schemas.microsoft.com/office/powerpoint/2010/main" val="3007787296"/>
       </p:ext>
     </p:extLst>
   </p:cSld>
@@ -24918,7 +24910,7 @@
     </p:spTree>
     <p:extLst>
       <p:ext uri="{BB962C8B-B14F-4D97-AF65-F5344CB8AC3E}">
-        <p14:creationId xmlns:p14="http://schemas.microsoft.com/office/powerpoint/2010/main" xmlns="" val="13878138"/>
+        <p14:creationId xmlns="" xmlns:p14="http://schemas.microsoft.com/office/powerpoint/2010/main" val="13878138"/>
       </p:ext>
     </p:extLst>
   </p:cSld>
@@ -25308,7 +25300,7 @@
     </p:spTree>
     <p:extLst>
       <p:ext uri="{BB962C8B-B14F-4D97-AF65-F5344CB8AC3E}">
-        <p14:creationId xmlns:p14="http://schemas.microsoft.com/office/powerpoint/2010/main" xmlns="" val="40929930"/>
+        <p14:creationId xmlns="" xmlns:p14="http://schemas.microsoft.com/office/powerpoint/2010/main" val="40929930"/>
       </p:ext>
     </p:extLst>
   </p:cSld>
@@ -25377,7 +25369,7 @@
           <a:blip r:embed="rId2" cstate="print">
             <a:extLst>
               <a:ext uri="{28A0092B-C50C-407E-A947-70E740481C1C}">
-                <a14:useLocalDpi xmlns:a14="http://schemas.microsoft.com/office/drawing/2010/main" xmlns="" val="0"/>
+                <a14:useLocalDpi xmlns="" xmlns:a14="http://schemas.microsoft.com/office/drawing/2010/main" val="0"/>
               </a:ext>
             </a:extLst>
           </a:blip>
@@ -25398,7 +25390,7 @@
     </p:spTree>
     <p:extLst>
       <p:ext uri="{BB962C8B-B14F-4D97-AF65-F5344CB8AC3E}">
-        <p14:creationId xmlns:p14="http://schemas.microsoft.com/office/powerpoint/2010/main" xmlns="" val="1336479164"/>
+        <p14:creationId xmlns="" xmlns:p14="http://schemas.microsoft.com/office/powerpoint/2010/main" val="1336479164"/>
       </p:ext>
     </p:extLst>
   </p:cSld>
@@ -25504,7 +25496,7 @@
     </p:spTree>
     <p:extLst>
       <p:ext uri="{BB962C8B-B14F-4D97-AF65-F5344CB8AC3E}">
-        <p14:creationId xmlns:p14="http://schemas.microsoft.com/office/powerpoint/2010/main" xmlns="" val="4014343169"/>
+        <p14:creationId xmlns="" xmlns:p14="http://schemas.microsoft.com/office/powerpoint/2010/main" val="4014343169"/>
       </p:ext>
     </p:extLst>
   </p:cSld>
@@ -25655,7 +25647,7 @@
     </p:spTree>
     <p:extLst>
       <p:ext uri="{BB962C8B-B14F-4D97-AF65-F5344CB8AC3E}">
-        <p14:creationId xmlns:p14="http://schemas.microsoft.com/office/powerpoint/2010/main" xmlns="" val="2781303602"/>
+        <p14:creationId xmlns="" xmlns:p14="http://schemas.microsoft.com/office/powerpoint/2010/main" val="2781303602"/>
       </p:ext>
     </p:extLst>
   </p:cSld>
@@ -25842,7 +25834,7 @@
     </p:spTree>
     <p:extLst>
       <p:ext uri="{BB962C8B-B14F-4D97-AF65-F5344CB8AC3E}">
-        <p14:creationId xmlns:p14="http://schemas.microsoft.com/office/powerpoint/2010/main" xmlns="" val="4255503392"/>
+        <p14:creationId xmlns="" xmlns:p14="http://schemas.microsoft.com/office/powerpoint/2010/main" val="4255503392"/>
       </p:ext>
     </p:extLst>
   </p:cSld>
@@ -26004,7 +25996,7 @@
     </p:spTree>
     <p:extLst>
       <p:ext uri="{BB962C8B-B14F-4D97-AF65-F5344CB8AC3E}">
-        <p14:creationId xmlns:p14="http://schemas.microsoft.com/office/powerpoint/2010/main" xmlns="" val="2375505937"/>
+        <p14:creationId xmlns="" xmlns:p14="http://schemas.microsoft.com/office/powerpoint/2010/main" val="2375505937"/>
       </p:ext>
     </p:extLst>
   </p:cSld>
@@ -26135,7 +26127,7 @@
     </p:spTree>
     <p:extLst>
       <p:ext uri="{BB962C8B-B14F-4D97-AF65-F5344CB8AC3E}">
-        <p14:creationId xmlns:p14="http://schemas.microsoft.com/office/powerpoint/2010/main" xmlns="" val="1618189430"/>
+        <p14:creationId xmlns="" xmlns:p14="http://schemas.microsoft.com/office/powerpoint/2010/main" val="1618189430"/>
       </p:ext>
     </p:extLst>
   </p:cSld>
@@ -26143,7 +26135,7 @@
     <a:masterClrMapping/>
   </p:clrMapOvr>
   <mc:AlternateContent xmlns:mc="http://schemas.openxmlformats.org/markup-compatibility/2006">
-    <mc:Choice xmlns:p14="http://schemas.microsoft.com/office/powerpoint/2010/main" xmlns="" Requires="p14">
+    <mc:Choice xmlns="" xmlns:p14="http://schemas.microsoft.com/office/powerpoint/2010/main" Requires="p14">
       <p:transition spd="slow" p14:dur="2000"/>
     </mc:Choice>
     <mc:Fallback>

</xml_diff>